<commit_message>
add an homogenous transformation matrix example
</commit_message>
<xml_diff>
--- a/Coordinate system.pptx
+++ b/Coordinate system.pptx
@@ -13,8 +13,12 @@
     <p:sldId id="269" r:id="rId7"/>
     <p:sldId id="270" r:id="rId8"/>
     <p:sldId id="271" r:id="rId9"/>
-    <p:sldId id="267" r:id="rId10"/>
-    <p:sldId id="259" r:id="rId11"/>
+    <p:sldId id="273" r:id="rId10"/>
+    <p:sldId id="274" r:id="rId11"/>
+    <p:sldId id="272" r:id="rId12"/>
+    <p:sldId id="275" r:id="rId13"/>
+    <p:sldId id="267" r:id="rId14"/>
+    <p:sldId id="259" r:id="rId15"/>
   </p:sldIdLst>
   <p:sldSz cx="12192000" cy="6858000"/>
   <p:notesSz cx="6858000" cy="9144000"/>
@@ -3066,9 +3070,878 @@
           <a:lstStyle/>
           <a:p>
             <a:r>
-              <a:rPr lang="en-SG" dirty="0"/>
-              <a:t>Coordinate system</a:t>
-            </a:r>
+              <a:rPr lang="en-SG" dirty="0" smtClean="0"/>
+              <a:t>Some useful HT matrices</a:t>
+            </a:r>
+            <a:endParaRPr lang="en-SG" dirty="0"/>
+          </a:p>
+        </p:txBody>
+      </p:sp>
+      <p:sp>
+        <p:nvSpPr>
+          <p:cNvPr id="3" name="内容占位符 2"/>
+          <p:cNvSpPr>
+            <a:spLocks noGrp="1"/>
+          </p:cNvSpPr>
+          <p:nvPr>
+            <p:ph idx="1"/>
+          </p:nvPr>
+        </p:nvSpPr>
+        <p:spPr/>
+        <p:txBody>
+          <a:bodyPr/>
+          <a:lstStyle/>
+          <a:p>
+            <a:r>
+              <a:rPr lang="en-SG" dirty="0" smtClean="0"/>
+              <a:t>Matrix pure shearing involved</a:t>
+            </a:r>
+          </a:p>
+          <a:p>
+            <a:endParaRPr lang="en-SG" dirty="0"/>
+          </a:p>
+          <a:p>
+            <a:endParaRPr lang="en-SG" dirty="0" smtClean="0"/>
+          </a:p>
+          <a:p>
+            <a:endParaRPr lang="en-SG" dirty="0"/>
+          </a:p>
+          <a:p>
+            <a:endParaRPr lang="en-SG" dirty="0" smtClean="0"/>
+          </a:p>
+          <a:p>
+            <a:endParaRPr lang="en-SG" dirty="0"/>
+          </a:p>
+          <a:p>
+            <a:r>
+              <a:rPr lang="en-SG" dirty="0" smtClean="0"/>
+              <a:t>At the same time, T part of this matrix is symmetric. Which means t</a:t>
+            </a:r>
+            <a:r>
+              <a:rPr lang="en-SG" baseline="-25000" dirty="0" smtClean="0"/>
+              <a:t>21</a:t>
+            </a:r>
+            <a:r>
+              <a:rPr lang="en-SG" dirty="0" smtClean="0"/>
+              <a:t>=t</a:t>
+            </a:r>
+            <a:r>
+              <a:rPr lang="en-SG" baseline="-25000" dirty="0"/>
+              <a:t>12</a:t>
+            </a:r>
+            <a:r>
+              <a:rPr lang="en-SG" dirty="0" smtClean="0"/>
+              <a:t>, t</a:t>
+            </a:r>
+            <a:r>
+              <a:rPr lang="en-SG" baseline="-25000" dirty="0"/>
+              <a:t>31</a:t>
+            </a:r>
+            <a:r>
+              <a:rPr lang="en-SG" dirty="0" smtClean="0"/>
+              <a:t>=t</a:t>
+            </a:r>
+            <a:r>
+              <a:rPr lang="en-SG" baseline="-25000" dirty="0"/>
+              <a:t>13</a:t>
+            </a:r>
+            <a:r>
+              <a:rPr lang="en-SG" dirty="0" smtClean="0"/>
+              <a:t>, t</a:t>
+            </a:r>
+            <a:r>
+              <a:rPr lang="en-SG" baseline="-25000" dirty="0"/>
+              <a:t>32</a:t>
+            </a:r>
+            <a:r>
+              <a:rPr lang="en-SG" dirty="0" smtClean="0"/>
+              <a:t>=t</a:t>
+            </a:r>
+            <a:r>
+              <a:rPr lang="en-SG" baseline="-25000" dirty="0"/>
+              <a:t>23</a:t>
+            </a:r>
+          </a:p>
+        </p:txBody>
+      </p:sp>
+      <p:graphicFrame>
+        <p:nvGraphicFramePr>
+          <p:cNvPr id="5" name="对象 4"/>
+          <p:cNvGraphicFramePr>
+            <a:graphicFrameLocks noChangeAspect="1"/>
+          </p:cNvGraphicFramePr>
+          <p:nvPr>
+            <p:extLst>
+              <p:ext uri="{D42A27DB-BD31-4B8C-83A1-F6EECF244321}">
+                <p14:modId xmlns:p14="http://schemas.microsoft.com/office/powerpoint/2010/main" val="3201033487"/>
+              </p:ext>
+            </p:extLst>
+          </p:nvPr>
+        </p:nvGraphicFramePr>
+        <p:xfrm>
+          <a:off x="4672013" y="2909888"/>
+          <a:ext cx="2409825" cy="1973262"/>
+        </p:xfrm>
+        <a:graphic>
+          <a:graphicData uri="http://schemas.openxmlformats.org/presentationml/2006/ole">
+            <mc:AlternateContent xmlns:mc="http://schemas.openxmlformats.org/markup-compatibility/2006">
+              <mc:Choice xmlns:v="urn:schemas-microsoft-com:vml" Requires="v">
+                <p:oleObj spid="_x0000_s6156" name="Equation" r:id="rId3" imgW="1117440" imgH="914400" progId="Equation.DSMT4">
+                  <p:embed/>
+                </p:oleObj>
+              </mc:Choice>
+              <mc:Fallback>
+                <p:oleObj name="Equation" r:id="rId3" imgW="1117440" imgH="914400" progId="Equation.DSMT4">
+                  <p:embed/>
+                  <p:pic>
+                    <p:nvPicPr>
+                      <p:cNvPr id="5" name="对象 4"/>
+                      <p:cNvPicPr/>
+                      <p:nvPr/>
+                    </p:nvPicPr>
+                    <p:blipFill>
+                      <a:blip r:embed="rId4"/>
+                      <a:stretch>
+                        <a:fillRect/>
+                      </a:stretch>
+                    </p:blipFill>
+                    <p:spPr>
+                      <a:xfrm>
+                        <a:off x="4672013" y="2909888"/>
+                        <a:ext cx="2409825" cy="1973262"/>
+                      </a:xfrm>
+                      <a:prstGeom prst="rect">
+                        <a:avLst/>
+                      </a:prstGeom>
+                    </p:spPr>
+                  </p:pic>
+                </p:oleObj>
+              </mc:Fallback>
+            </mc:AlternateContent>
+          </a:graphicData>
+        </a:graphic>
+      </p:graphicFrame>
+    </p:spTree>
+    <p:extLst>
+      <p:ext uri="{BB962C8B-B14F-4D97-AF65-F5344CB8AC3E}">
+        <p14:creationId xmlns:p14="http://schemas.microsoft.com/office/powerpoint/2010/main" val="1738318438"/>
+      </p:ext>
+    </p:extLst>
+  </p:cSld>
+  <p:clrMapOvr>
+    <a:masterClrMapping/>
+  </p:clrMapOvr>
+</p:sld>
+</file>
+
+<file path=ppt/slides/slide11.xml><?xml version="1.0" encoding="utf-8"?>
+<p:sld xmlns:a="http://schemas.openxmlformats.org/drawingml/2006/main" xmlns:r="http://schemas.openxmlformats.org/officeDocument/2006/relationships" xmlns:p="http://schemas.openxmlformats.org/presentationml/2006/main">
+  <p:cSld>
+    <p:spTree>
+      <p:nvGrpSpPr>
+        <p:cNvPr id="1" name=""/>
+        <p:cNvGrpSpPr/>
+        <p:nvPr/>
+      </p:nvGrpSpPr>
+      <p:grpSpPr>
+        <a:xfrm>
+          <a:off x="0" y="0"/>
+          <a:ext cx="0" cy="0"/>
+          <a:chOff x="0" y="0"/>
+          <a:chExt cx="0" cy="0"/>
+        </a:xfrm>
+      </p:grpSpPr>
+      <p:sp>
+        <p:nvSpPr>
+          <p:cNvPr id="3" name="内容占位符 2"/>
+          <p:cNvSpPr>
+            <a:spLocks noGrp="1"/>
+          </p:cNvSpPr>
+          <p:nvPr>
+            <p:ph idx="1"/>
+          </p:nvPr>
+        </p:nvSpPr>
+        <p:spPr>
+          <a:xfrm>
+            <a:off x="838200" y="345057"/>
+            <a:ext cx="10515600" cy="5831906"/>
+          </a:xfrm>
+        </p:spPr>
+        <p:txBody>
+          <a:bodyPr/>
+          <a:lstStyle/>
+          <a:p>
+            <a:r>
+              <a:rPr lang="en-SG" dirty="0" smtClean="0"/>
+              <a:t>Example: Given a cube with length of edge 1 at the origin O, assume vertex O is fixed, and there is a homogenous transformation which shear vertex F(1,1,1) to F’(1,1,2). Find out the transformation matrix and the new positions of all vertices.</a:t>
+            </a:r>
+            <a:endParaRPr lang="en-SG" dirty="0"/>
+          </a:p>
+        </p:txBody>
+      </p:sp>
+      <p:pic>
+        <p:nvPicPr>
+          <p:cNvPr id="4" name="图片 3"/>
+          <p:cNvPicPr>
+            <a:picLocks noChangeAspect="1"/>
+          </p:cNvPicPr>
+          <p:nvPr/>
+        </p:nvPicPr>
+        <p:blipFill>
+          <a:blip r:embed="rId2"/>
+          <a:stretch>
+            <a:fillRect/>
+          </a:stretch>
+        </p:blipFill>
+        <p:spPr>
+          <a:xfrm>
+            <a:off x="1856229" y="2651365"/>
+            <a:ext cx="2648086" cy="2159111"/>
+          </a:xfrm>
+          <a:prstGeom prst="rect">
+            <a:avLst/>
+          </a:prstGeom>
+        </p:spPr>
+      </p:pic>
+      <p:sp>
+        <p:nvSpPr>
+          <p:cNvPr id="6" name="右箭头 5"/>
+          <p:cNvSpPr/>
+          <p:nvPr/>
+        </p:nvSpPr>
+        <p:spPr>
+          <a:xfrm>
+            <a:off x="5218627" y="3592897"/>
+            <a:ext cx="802257" cy="276045"/>
+          </a:xfrm>
+          <a:prstGeom prst="rightArrow">
+            <a:avLst/>
+          </a:prstGeom>
+        </p:spPr>
+        <p:style>
+          <a:lnRef idx="2">
+            <a:schemeClr val="accent1">
+              <a:shade val="50000"/>
+            </a:schemeClr>
+          </a:lnRef>
+          <a:fillRef idx="1">
+            <a:schemeClr val="accent1"/>
+          </a:fillRef>
+          <a:effectRef idx="0">
+            <a:schemeClr val="accent1"/>
+          </a:effectRef>
+          <a:fontRef idx="minor">
+            <a:schemeClr val="lt1"/>
+          </a:fontRef>
+        </p:style>
+        <p:txBody>
+          <a:bodyPr rtlCol="0" anchor="ctr"/>
+          <a:lstStyle/>
+          <a:p>
+            <a:pPr algn="ctr"/>
+            <a:endParaRPr lang="en-SG"/>
+          </a:p>
+        </p:txBody>
+      </p:sp>
+      <p:pic>
+        <p:nvPicPr>
+          <p:cNvPr id="7" name="图片 6"/>
+          <p:cNvPicPr>
+            <a:picLocks noChangeAspect="1"/>
+          </p:cNvPicPr>
+          <p:nvPr/>
+        </p:nvPicPr>
+        <p:blipFill>
+          <a:blip r:embed="rId3"/>
+          <a:stretch>
+            <a:fillRect/>
+          </a:stretch>
+        </p:blipFill>
+        <p:spPr>
+          <a:xfrm>
+            <a:off x="6735196" y="2651365"/>
+            <a:ext cx="2387723" cy="2197213"/>
+          </a:xfrm>
+          <a:prstGeom prst="rect">
+            <a:avLst/>
+          </a:prstGeom>
+        </p:spPr>
+      </p:pic>
+    </p:spTree>
+    <p:extLst>
+      <p:ext uri="{BB962C8B-B14F-4D97-AF65-F5344CB8AC3E}">
+        <p14:creationId xmlns:p14="http://schemas.microsoft.com/office/powerpoint/2010/main" val="3990800399"/>
+      </p:ext>
+    </p:extLst>
+  </p:cSld>
+  <p:clrMapOvr>
+    <a:masterClrMapping/>
+  </p:clrMapOvr>
+</p:sld>
+</file>
+
+<file path=ppt/slides/slide12.xml><?xml version="1.0" encoding="utf-8"?>
+<p:sld xmlns:a="http://schemas.openxmlformats.org/drawingml/2006/main" xmlns:r="http://schemas.openxmlformats.org/officeDocument/2006/relationships" xmlns:p="http://schemas.openxmlformats.org/presentationml/2006/main">
+  <p:cSld>
+    <p:spTree>
+      <p:nvGrpSpPr>
+        <p:cNvPr id="1" name=""/>
+        <p:cNvGrpSpPr/>
+        <p:nvPr/>
+      </p:nvGrpSpPr>
+      <p:grpSpPr>
+        <a:xfrm>
+          <a:off x="0" y="0"/>
+          <a:ext cx="0" cy="0"/>
+          <a:chOff x="0" y="0"/>
+          <a:chExt cx="0" cy="0"/>
+        </a:xfrm>
+      </p:grpSpPr>
+      <p:sp>
+        <p:nvSpPr>
+          <p:cNvPr id="3" name="内容占位符 2"/>
+          <p:cNvSpPr>
+            <a:spLocks noGrp="1"/>
+          </p:cNvSpPr>
+          <p:nvPr>
+            <p:ph idx="1"/>
+          </p:nvPr>
+        </p:nvSpPr>
+        <p:spPr>
+          <a:xfrm>
+            <a:off x="838200" y="500332"/>
+            <a:ext cx="10515600" cy="5676631"/>
+          </a:xfrm>
+        </p:spPr>
+        <p:txBody>
+          <a:bodyPr/>
+          <a:lstStyle/>
+          <a:p>
+            <a:r>
+              <a:rPr lang="en-SG" dirty="0" smtClean="0"/>
+              <a:t>To vertex E, we have the linear equations after taking use of shearing transformation</a:t>
+            </a:r>
+          </a:p>
+          <a:p>
+            <a:endParaRPr lang="en-SG" dirty="0"/>
+          </a:p>
+          <a:p>
+            <a:endParaRPr lang="en-SG" dirty="0" smtClean="0"/>
+          </a:p>
+          <a:p>
+            <a:endParaRPr lang="en-SG" dirty="0"/>
+          </a:p>
+          <a:p>
+            <a:pPr marL="0" indent="0">
+              <a:buNone/>
+            </a:pPr>
+            <a:endParaRPr lang="en-SG" dirty="0"/>
+          </a:p>
+          <a:p>
+            <a:r>
+              <a:rPr lang="en-SG" dirty="0" smtClean="0"/>
+              <a:t>The solution of homogenous transformation matrix is</a:t>
+            </a:r>
+          </a:p>
+          <a:p>
+            <a:endParaRPr lang="en-SG" dirty="0" smtClean="0"/>
+          </a:p>
+          <a:p>
+            <a:endParaRPr lang="en-SG" dirty="0"/>
+          </a:p>
+        </p:txBody>
+      </p:sp>
+      <p:graphicFrame>
+        <p:nvGraphicFramePr>
+          <p:cNvPr id="4" name="对象 3"/>
+          <p:cNvGraphicFramePr>
+            <a:graphicFrameLocks noChangeAspect="1"/>
+          </p:cNvGraphicFramePr>
+          <p:nvPr>
+            <p:extLst>
+              <p:ext uri="{D42A27DB-BD31-4B8C-83A1-F6EECF244321}">
+                <p14:modId xmlns:p14="http://schemas.microsoft.com/office/powerpoint/2010/main" val="1081413183"/>
+              </p:ext>
+            </p:extLst>
+          </p:nvPr>
+        </p:nvGraphicFramePr>
+        <p:xfrm>
+          <a:off x="3729725" y="1677687"/>
+          <a:ext cx="4652825" cy="1626230"/>
+        </p:xfrm>
+        <a:graphic>
+          <a:graphicData uri="http://schemas.openxmlformats.org/presentationml/2006/ole">
+            <mc:AlternateContent xmlns:mc="http://schemas.openxmlformats.org/markup-compatibility/2006">
+              <mc:Choice xmlns:v="urn:schemas-microsoft-com:vml" Requires="v">
+                <p:oleObj spid="_x0000_s7172" name="Equation" r:id="rId3" imgW="2616120" imgH="914400" progId="Equation.DSMT4">
+                  <p:embed/>
+                </p:oleObj>
+              </mc:Choice>
+              <mc:Fallback>
+                <p:oleObj name="Equation" r:id="rId3" imgW="2616120" imgH="914400" progId="Equation.DSMT4">
+                  <p:embed/>
+                  <p:pic>
+                    <p:nvPicPr>
+                      <p:cNvPr id="0" name=""/>
+                      <p:cNvPicPr/>
+                      <p:nvPr/>
+                    </p:nvPicPr>
+                    <p:blipFill>
+                      <a:blip r:embed="rId4"/>
+                      <a:stretch>
+                        <a:fillRect/>
+                      </a:stretch>
+                    </p:blipFill>
+                    <p:spPr>
+                      <a:xfrm>
+                        <a:off x="3729725" y="1677687"/>
+                        <a:ext cx="4652825" cy="1626230"/>
+                      </a:xfrm>
+                      <a:prstGeom prst="rect">
+                        <a:avLst/>
+                      </a:prstGeom>
+                    </p:spPr>
+                  </p:pic>
+                </p:oleObj>
+              </mc:Fallback>
+            </mc:AlternateContent>
+          </a:graphicData>
+        </a:graphic>
+      </p:graphicFrame>
+      <p:graphicFrame>
+        <p:nvGraphicFramePr>
+          <p:cNvPr id="5" name="对象 4"/>
+          <p:cNvGraphicFramePr>
+            <a:graphicFrameLocks noChangeAspect="1"/>
+          </p:cNvGraphicFramePr>
+          <p:nvPr>
+            <p:extLst>
+              <p:ext uri="{D42A27DB-BD31-4B8C-83A1-F6EECF244321}">
+                <p14:modId xmlns:p14="http://schemas.microsoft.com/office/powerpoint/2010/main" val="1502511448"/>
+              </p:ext>
+            </p:extLst>
+          </p:nvPr>
+        </p:nvGraphicFramePr>
+        <p:xfrm>
+          <a:off x="3851275" y="4024313"/>
+          <a:ext cx="3708400" cy="2152650"/>
+        </p:xfrm>
+        <a:graphic>
+          <a:graphicData uri="http://schemas.openxmlformats.org/presentationml/2006/ole">
+            <mc:AlternateContent xmlns:mc="http://schemas.openxmlformats.org/markup-compatibility/2006">
+              <mc:Choice xmlns:v="urn:schemas-microsoft-com:vml" Requires="v">
+                <p:oleObj spid="_x0000_s7173" name="Equation" r:id="rId5" imgW="1574640" imgH="914400" progId="Equation.DSMT4">
+                  <p:embed/>
+                </p:oleObj>
+              </mc:Choice>
+              <mc:Fallback>
+                <p:oleObj name="Equation" r:id="rId5" imgW="1574640" imgH="914400" progId="Equation.DSMT4">
+                  <p:embed/>
+                  <p:pic>
+                    <p:nvPicPr>
+                      <p:cNvPr id="0" name=""/>
+                      <p:cNvPicPr/>
+                      <p:nvPr/>
+                    </p:nvPicPr>
+                    <p:blipFill>
+                      <a:blip r:embed="rId6"/>
+                      <a:stretch>
+                        <a:fillRect/>
+                      </a:stretch>
+                    </p:blipFill>
+                    <p:spPr>
+                      <a:xfrm>
+                        <a:off x="3851275" y="4024313"/>
+                        <a:ext cx="3708400" cy="2152650"/>
+                      </a:xfrm>
+                      <a:prstGeom prst="rect">
+                        <a:avLst/>
+                      </a:prstGeom>
+                    </p:spPr>
+                  </p:pic>
+                </p:oleObj>
+              </mc:Fallback>
+            </mc:AlternateContent>
+          </a:graphicData>
+        </a:graphic>
+      </p:graphicFrame>
+    </p:spTree>
+    <p:extLst>
+      <p:ext uri="{BB962C8B-B14F-4D97-AF65-F5344CB8AC3E}">
+        <p14:creationId xmlns:p14="http://schemas.microsoft.com/office/powerpoint/2010/main" val="1218149739"/>
+      </p:ext>
+    </p:extLst>
+  </p:cSld>
+  <p:clrMapOvr>
+    <a:masterClrMapping/>
+  </p:clrMapOvr>
+</p:sld>
+</file>
+
+<file path=ppt/slides/slide13.xml><?xml version="1.0" encoding="utf-8"?>
+<p:sld xmlns:a="http://schemas.openxmlformats.org/drawingml/2006/main" xmlns:r="http://schemas.openxmlformats.org/officeDocument/2006/relationships" xmlns:p="http://schemas.openxmlformats.org/presentationml/2006/main">
+  <p:cSld>
+    <p:spTree>
+      <p:nvGrpSpPr>
+        <p:cNvPr id="1" name=""/>
+        <p:cNvGrpSpPr/>
+        <p:nvPr/>
+      </p:nvGrpSpPr>
+      <p:grpSpPr>
+        <a:xfrm>
+          <a:off x="0" y="0"/>
+          <a:ext cx="0" cy="0"/>
+          <a:chOff x="0" y="0"/>
+          <a:chExt cx="0" cy="0"/>
+        </a:xfrm>
+      </p:grpSpPr>
+      <p:sp>
+        <p:nvSpPr>
+          <p:cNvPr id="2" name="标题 1"/>
+          <p:cNvSpPr>
+            <a:spLocks noGrp="1"/>
+          </p:cNvSpPr>
+          <p:nvPr>
+            <p:ph type="title"/>
+          </p:nvPr>
+        </p:nvSpPr>
+        <p:spPr/>
+        <p:txBody>
+          <a:bodyPr/>
+          <a:lstStyle/>
+          <a:p>
+            <a:r>
+              <a:rPr lang="en-SG" dirty="0" smtClean="0"/>
+              <a:t>Screen coordinate system (SCS)</a:t>
+            </a:r>
+            <a:endParaRPr lang="en-SG" dirty="0"/>
+          </a:p>
+        </p:txBody>
+      </p:sp>
+      <p:sp>
+        <p:nvSpPr>
+          <p:cNvPr id="3" name="内容占位符 2"/>
+          <p:cNvSpPr>
+            <a:spLocks noGrp="1"/>
+          </p:cNvSpPr>
+          <p:nvPr>
+            <p:ph idx="1"/>
+          </p:nvPr>
+        </p:nvSpPr>
+        <p:spPr>
+          <a:xfrm>
+            <a:off x="838200" y="1825625"/>
+            <a:ext cx="6775958" cy="4351338"/>
+          </a:xfrm>
+        </p:spPr>
+        <p:txBody>
+          <a:bodyPr>
+            <a:normAutofit lnSpcReduction="10000"/>
+          </a:bodyPr>
+          <a:lstStyle/>
+          <a:p>
+            <a:r>
+              <a:rPr lang="en-SG" dirty="0" smtClean="0"/>
+              <a:t>The coordinate system of screen is a 2D Cartesian coordinate system, which origin (0,0) locates at left-upper corner of the screen. The scale of SCS usually depends on the resolution of screen. For example if the revolution of a screen is 1096x1024, which means the X axis extend to right of screen until scale of 1096, and the Y axis extend to bottom of screen until scale of 1024.</a:t>
+            </a:r>
+          </a:p>
+          <a:p>
+            <a:r>
+              <a:rPr lang="en-SG" dirty="0" smtClean="0"/>
+              <a:t>The SCS is mainly used to display correct images on screen device. So it is pixel related. </a:t>
+            </a:r>
+            <a:endParaRPr lang="en-SG" dirty="0"/>
+          </a:p>
+        </p:txBody>
+      </p:sp>
+      <p:sp>
+        <p:nvSpPr>
+          <p:cNvPr id="4" name="矩形 3"/>
+          <p:cNvSpPr/>
+          <p:nvPr/>
+        </p:nvSpPr>
+        <p:spPr>
+          <a:xfrm>
+            <a:off x="7919049" y="2449902"/>
+            <a:ext cx="3881887" cy="2544792"/>
+          </a:xfrm>
+          <a:prstGeom prst="rect">
+            <a:avLst/>
+          </a:prstGeom>
+          <a:noFill/>
+        </p:spPr>
+        <p:style>
+          <a:lnRef idx="2">
+            <a:schemeClr val="accent1">
+              <a:shade val="50000"/>
+            </a:schemeClr>
+          </a:lnRef>
+          <a:fillRef idx="1">
+            <a:schemeClr val="accent1"/>
+          </a:fillRef>
+          <a:effectRef idx="0">
+            <a:schemeClr val="accent1"/>
+          </a:effectRef>
+          <a:fontRef idx="minor">
+            <a:schemeClr val="lt1"/>
+          </a:fontRef>
+        </p:style>
+        <p:txBody>
+          <a:bodyPr rtlCol="0" anchor="ctr"/>
+          <a:lstStyle/>
+          <a:p>
+            <a:pPr algn="ctr"/>
+            <a:endParaRPr lang="en-SG"/>
+          </a:p>
+        </p:txBody>
+      </p:sp>
+      <p:sp>
+        <p:nvSpPr>
+          <p:cNvPr id="7" name="矩形 6"/>
+          <p:cNvSpPr/>
+          <p:nvPr/>
+        </p:nvSpPr>
+        <p:spPr>
+          <a:xfrm>
+            <a:off x="7782560" y="2357120"/>
+            <a:ext cx="4145280" cy="2773680"/>
+          </a:xfrm>
+          <a:prstGeom prst="rect">
+            <a:avLst/>
+          </a:prstGeom>
+          <a:noFill/>
+        </p:spPr>
+        <p:style>
+          <a:lnRef idx="2">
+            <a:schemeClr val="accent1">
+              <a:shade val="50000"/>
+            </a:schemeClr>
+          </a:lnRef>
+          <a:fillRef idx="1">
+            <a:schemeClr val="accent1"/>
+          </a:fillRef>
+          <a:effectRef idx="0">
+            <a:schemeClr val="accent1"/>
+          </a:effectRef>
+          <a:fontRef idx="minor">
+            <a:schemeClr val="lt1"/>
+          </a:fontRef>
+        </p:style>
+        <p:txBody>
+          <a:bodyPr rtlCol="0" anchor="ctr"/>
+          <a:lstStyle/>
+          <a:p>
+            <a:pPr algn="ctr"/>
+            <a:endParaRPr lang="en-SG"/>
+          </a:p>
+        </p:txBody>
+      </p:sp>
+      <p:cxnSp>
+        <p:nvCxnSpPr>
+          <p:cNvPr id="9" name="直接箭头连接符 8"/>
+          <p:cNvCxnSpPr/>
+          <p:nvPr/>
+        </p:nvCxnSpPr>
+        <p:spPr>
+          <a:xfrm flipV="1">
+            <a:off x="8087360" y="2631440"/>
+            <a:ext cx="2214880" cy="10160"/>
+          </a:xfrm>
+          <a:prstGeom prst="straightConnector1">
+            <a:avLst/>
+          </a:prstGeom>
+          <a:ln>
+            <a:tailEnd type="triangle"/>
+          </a:ln>
+        </p:spPr>
+        <p:style>
+          <a:lnRef idx="1">
+            <a:schemeClr val="dk1"/>
+          </a:lnRef>
+          <a:fillRef idx="0">
+            <a:schemeClr val="dk1"/>
+          </a:fillRef>
+          <a:effectRef idx="0">
+            <a:schemeClr val="dk1"/>
+          </a:effectRef>
+          <a:fontRef idx="minor">
+            <a:schemeClr val="tx1"/>
+          </a:fontRef>
+        </p:style>
+      </p:cxnSp>
+      <p:cxnSp>
+        <p:nvCxnSpPr>
+          <p:cNvPr id="11" name="直接箭头连接符 10"/>
+          <p:cNvCxnSpPr/>
+          <p:nvPr/>
+        </p:nvCxnSpPr>
+        <p:spPr>
+          <a:xfrm>
+            <a:off x="8087360" y="2651760"/>
+            <a:ext cx="0" cy="1645920"/>
+          </a:xfrm>
+          <a:prstGeom prst="straightConnector1">
+            <a:avLst/>
+          </a:prstGeom>
+          <a:ln>
+            <a:tailEnd type="triangle"/>
+          </a:ln>
+        </p:spPr>
+        <p:style>
+          <a:lnRef idx="1">
+            <a:schemeClr val="dk1"/>
+          </a:lnRef>
+          <a:fillRef idx="0">
+            <a:schemeClr val="dk1"/>
+          </a:fillRef>
+          <a:effectRef idx="0">
+            <a:schemeClr val="dk1"/>
+          </a:effectRef>
+          <a:fontRef idx="minor">
+            <a:schemeClr val="tx1"/>
+          </a:fontRef>
+        </p:style>
+      </p:cxnSp>
+      <p:sp>
+        <p:nvSpPr>
+          <p:cNvPr id="12" name="文本框 11"/>
+          <p:cNvSpPr txBox="1"/>
+          <p:nvPr/>
+        </p:nvSpPr>
+        <p:spPr>
+          <a:xfrm>
+            <a:off x="10322606" y="2631440"/>
+            <a:ext cx="304892" cy="369332"/>
+          </a:xfrm>
+          <a:prstGeom prst="rect">
+            <a:avLst/>
+          </a:prstGeom>
+          <a:noFill/>
+        </p:spPr>
+        <p:txBody>
+          <a:bodyPr wrap="none" rtlCol="0">
+            <a:spAutoFit/>
+          </a:bodyPr>
+          <a:lstStyle/>
+          <a:p>
+            <a:r>
+              <a:rPr lang="en-SG" dirty="0" smtClean="0"/>
+              <a:t>X</a:t>
+            </a:r>
+            <a:endParaRPr lang="en-SG" dirty="0"/>
+          </a:p>
+        </p:txBody>
+      </p:sp>
+      <p:sp>
+        <p:nvSpPr>
+          <p:cNvPr id="13" name="文本框 12"/>
+          <p:cNvSpPr txBox="1"/>
+          <p:nvPr/>
+        </p:nvSpPr>
+        <p:spPr>
+          <a:xfrm>
+            <a:off x="8087360" y="4205796"/>
+            <a:ext cx="304892" cy="369332"/>
+          </a:xfrm>
+          <a:prstGeom prst="rect">
+            <a:avLst/>
+          </a:prstGeom>
+          <a:noFill/>
+        </p:spPr>
+        <p:txBody>
+          <a:bodyPr wrap="none" rtlCol="0">
+            <a:spAutoFit/>
+          </a:bodyPr>
+          <a:lstStyle/>
+          <a:p>
+            <a:r>
+              <a:rPr lang="en-SG" dirty="0" smtClean="0"/>
+              <a:t>Y</a:t>
+            </a:r>
+            <a:endParaRPr lang="en-SG" dirty="0"/>
+          </a:p>
+        </p:txBody>
+      </p:sp>
+      <p:sp>
+        <p:nvSpPr>
+          <p:cNvPr id="14" name="文本框 13"/>
+          <p:cNvSpPr txBox="1"/>
+          <p:nvPr/>
+        </p:nvSpPr>
+        <p:spPr>
+          <a:xfrm>
+            <a:off x="8133839" y="2725564"/>
+            <a:ext cx="617477" cy="369332"/>
+          </a:xfrm>
+          <a:prstGeom prst="rect">
+            <a:avLst/>
+          </a:prstGeom>
+          <a:noFill/>
+        </p:spPr>
+        <p:txBody>
+          <a:bodyPr wrap="none" rtlCol="0">
+            <a:spAutoFit/>
+          </a:bodyPr>
+          <a:lstStyle/>
+          <a:p>
+            <a:r>
+              <a:rPr lang="en-SG" dirty="0" smtClean="0"/>
+              <a:t>(0,0)</a:t>
+            </a:r>
+            <a:endParaRPr lang="en-SG" dirty="0"/>
+          </a:p>
+        </p:txBody>
+      </p:sp>
+    </p:spTree>
+    <p:extLst>
+      <p:ext uri="{BB962C8B-B14F-4D97-AF65-F5344CB8AC3E}">
+        <p14:creationId xmlns:p14="http://schemas.microsoft.com/office/powerpoint/2010/main" val="4149977321"/>
+      </p:ext>
+    </p:extLst>
+  </p:cSld>
+  <p:clrMapOvr>
+    <a:masterClrMapping/>
+  </p:clrMapOvr>
+</p:sld>
+</file>
+
+<file path=ppt/slides/slide14.xml><?xml version="1.0" encoding="utf-8"?>
+<p:sld xmlns:a="http://schemas.openxmlformats.org/drawingml/2006/main" xmlns:r="http://schemas.openxmlformats.org/officeDocument/2006/relationships" xmlns:p="http://schemas.openxmlformats.org/presentationml/2006/main">
+  <p:cSld>
+    <p:spTree>
+      <p:nvGrpSpPr>
+        <p:cNvPr id="1" name=""/>
+        <p:cNvGrpSpPr/>
+        <p:nvPr/>
+      </p:nvGrpSpPr>
+      <p:grpSpPr>
+        <a:xfrm>
+          <a:off x="0" y="0"/>
+          <a:ext cx="0" cy="0"/>
+          <a:chOff x="0" y="0"/>
+          <a:chExt cx="0" cy="0"/>
+        </a:xfrm>
+      </p:grpSpPr>
+      <p:sp>
+        <p:nvSpPr>
+          <p:cNvPr id="2" name="标题 1"/>
+          <p:cNvSpPr>
+            <a:spLocks noGrp="1"/>
+          </p:cNvSpPr>
+          <p:nvPr>
+            <p:ph type="title"/>
+          </p:nvPr>
+        </p:nvSpPr>
+        <p:spPr/>
+        <p:txBody>
+          <a:bodyPr/>
+          <a:lstStyle/>
+          <a:p>
+            <a:r>
+              <a:rPr lang="en-SG" dirty="0" smtClean="0"/>
+              <a:t>Some tips</a:t>
+            </a:r>
+            <a:endParaRPr lang="en-SG" dirty="0"/>
           </a:p>
         </p:txBody>
       </p:sp>
@@ -3119,19 +3992,31 @@
           <a:p>
             <a:r>
               <a:rPr lang="en-SG" dirty="0" smtClean="0"/>
-              <a:t>From the view of user, the inputted geometrical elements will firstly transform to </a:t>
+              <a:t>From the view of user, </a:t>
+            </a:r>
+            <a:r>
+              <a:rPr lang="en-SG" dirty="0" smtClean="0"/>
+              <a:t>whose input geometrical </a:t>
+            </a:r>
+            <a:r>
+              <a:rPr lang="en-SG" dirty="0" smtClean="0"/>
+              <a:t>elements will firstly transform to </a:t>
             </a:r>
             <a:r>
               <a:rPr lang="en-US" dirty="0" smtClean="0"/>
-              <a:t>uniforms under MCS, then through display converting package developed by CAD software provider, all </a:t>
+              <a:t>uniforms </a:t>
+            </a:r>
+            <a:r>
+              <a:rPr lang="en-US" dirty="0" smtClean="0"/>
+              <a:t>representations under </a:t>
+            </a:r>
+            <a:r>
+              <a:rPr lang="en-US" dirty="0" smtClean="0"/>
+              <a:t>MCS, then through display converting package developed by CAD software provider, all </a:t>
             </a:r>
             <a:r>
               <a:rPr lang="en-US" altLang="zh-CN" dirty="0" smtClean="0"/>
-              <a:t>3D geometrical items will be shown on the 2D screen</a:t>
-            </a:r>
-            <a:r>
-              <a:rPr lang="en-US" altLang="zh-CN" smtClean="0"/>
-              <a:t>. </a:t>
+              <a:t>3D geometrical items will be shown on the 2D screen. </a:t>
             </a:r>
             <a:endParaRPr lang="en-SG" dirty="0"/>
           </a:p>
@@ -3636,7 +4521,7 @@
           <a:graphicData uri="http://schemas.openxmlformats.org/presentationml/2006/ole">
             <mc:AlternateContent xmlns:mc="http://schemas.openxmlformats.org/markup-compatibility/2006">
               <mc:Choice xmlns:v="urn:schemas-microsoft-com:vml" Requires="v">
-                <p:oleObj spid="_x0000_s1079" name="Equation" r:id="rId3" imgW="711000" imgH="203040" progId="Equation.DSMT4">
+                <p:oleObj spid="_x0000_s1147" name="Equation" r:id="rId3" imgW="711000" imgH="203040" progId="Equation.DSMT4">
                   <p:embed/>
                 </p:oleObj>
               </mc:Choice>
@@ -3693,7 +4578,7 @@
           <a:graphicData uri="http://schemas.openxmlformats.org/presentationml/2006/ole">
             <mc:AlternateContent xmlns:mc="http://schemas.openxmlformats.org/markup-compatibility/2006">
               <mc:Choice xmlns:v="urn:schemas-microsoft-com:vml" Requires="v">
-                <p:oleObj spid="_x0000_s1080" name="Equation" r:id="rId5" imgW="583920" imgH="203040" progId="Equation.DSMT4">
+                <p:oleObj spid="_x0000_s1148" name="Equation" r:id="rId5" imgW="583920" imgH="203040" progId="Equation.DSMT4">
                   <p:embed/>
                 </p:oleObj>
               </mc:Choice>
@@ -3750,7 +4635,7 @@
           <a:graphicData uri="http://schemas.openxmlformats.org/presentationml/2006/ole">
             <mc:AlternateContent xmlns:mc="http://schemas.openxmlformats.org/markup-compatibility/2006">
               <mc:Choice xmlns:v="urn:schemas-microsoft-com:vml" Requires="v">
-                <p:oleObj spid="_x0000_s1081" name="Equation" r:id="rId7" imgW="469800" imgH="177480" progId="Equation.DSMT4">
+                <p:oleObj spid="_x0000_s1149" name="Equation" r:id="rId7" imgW="469800" imgH="177480" progId="Equation.DSMT4">
                   <p:embed/>
                 </p:oleObj>
               </mc:Choice>
@@ -3807,7 +4692,7 @@
           <a:graphicData uri="http://schemas.openxmlformats.org/presentationml/2006/ole">
             <mc:AlternateContent xmlns:mc="http://schemas.openxmlformats.org/markup-compatibility/2006">
               <mc:Choice xmlns:v="urn:schemas-microsoft-com:vml" Requires="v">
-                <p:oleObj spid="_x0000_s1082" name="Equation" r:id="rId9" imgW="1600200" imgH="711000" progId="Equation.DSMT4">
+                <p:oleObj spid="_x0000_s1150" name="Equation" r:id="rId9" imgW="1600200" imgH="711000" progId="Equation.DSMT4">
                   <p:embed/>
                 </p:oleObj>
               </mc:Choice>
@@ -3966,7 +4851,7 @@
           <a:graphicData uri="http://schemas.openxmlformats.org/presentationml/2006/ole">
             <mc:AlternateContent xmlns:mc="http://schemas.openxmlformats.org/markup-compatibility/2006">
               <mc:Choice xmlns:v="urn:schemas-microsoft-com:vml" Requires="v">
-                <p:oleObj spid="_x0000_s2061" name="Equation" r:id="rId3" imgW="1155600" imgH="914400" progId="Equation.DSMT4">
+                <p:oleObj spid="_x0000_s2078" name="Equation" r:id="rId3" imgW="1155600" imgH="914400" progId="Equation.DSMT4">
                   <p:embed/>
                 </p:oleObj>
               </mc:Choice>
@@ -4188,7 +5073,7 @@
           <a:graphicData uri="http://schemas.openxmlformats.org/presentationml/2006/ole">
             <mc:AlternateContent xmlns:mc="http://schemas.openxmlformats.org/markup-compatibility/2006">
               <mc:Choice xmlns:v="urn:schemas-microsoft-com:vml" Requires="v">
-                <p:oleObj spid="_x0000_s3094" name="Equation" r:id="rId3" imgW="1091880" imgH="711000" progId="Equation.DSMT4">
+                <p:oleObj spid="_x0000_s3128" name="Equation" r:id="rId3" imgW="1091880" imgH="711000" progId="Equation.DSMT4">
                   <p:embed/>
                 </p:oleObj>
               </mc:Choice>
@@ -4245,7 +5130,7 @@
           <a:graphicData uri="http://schemas.openxmlformats.org/presentationml/2006/ole">
             <mc:AlternateContent xmlns:mc="http://schemas.openxmlformats.org/markup-compatibility/2006">
               <mc:Choice xmlns:v="urn:schemas-microsoft-com:vml" Requires="v">
-                <p:oleObj spid="_x0000_s3095" name="Equation" r:id="rId5" imgW="571320" imgH="457200" progId="Equation.DSMT4">
+                <p:oleObj spid="_x0000_s3129" name="Equation" r:id="rId5" imgW="571320" imgH="457200" progId="Equation.DSMT4">
                   <p:embed/>
                 </p:oleObj>
               </mc:Choice>
@@ -4327,8 +5212,13 @@
           <a:p>
             <a:r>
               <a:rPr lang="en-SG" dirty="0"/>
-              <a:t>Homogenous transformation</a:t>
-            </a:r>
+              <a:t>Homogenous </a:t>
+            </a:r>
+            <a:r>
+              <a:rPr lang="en-SG" dirty="0" smtClean="0"/>
+              <a:t>transformation matrix</a:t>
+            </a:r>
+            <a:endParaRPr lang="en-SG" dirty="0"/>
           </a:p>
         </p:txBody>
       </p:sp>
@@ -4364,7 +5254,7 @@
           <p:nvPr>
             <p:extLst>
               <p:ext uri="{D42A27DB-BD31-4B8C-83A1-F6EECF244321}">
-                <p14:modId xmlns:p14="http://schemas.microsoft.com/office/powerpoint/2010/main" val="182805841"/>
+                <p14:modId xmlns:p14="http://schemas.microsoft.com/office/powerpoint/2010/main" val="3834687752"/>
               </p:ext>
             </p:extLst>
           </p:nvPr>
@@ -4377,7 +5267,7 @@
           <a:graphicData uri="http://schemas.openxmlformats.org/presentationml/2006/ole">
             <mc:AlternateContent xmlns:mc="http://schemas.openxmlformats.org/markup-compatibility/2006">
               <mc:Choice xmlns:v="urn:schemas-microsoft-com:vml" Requires="v">
-                <p:oleObj spid="_x0000_s4108" name="Equation" r:id="rId3" imgW="3682800" imgH="914400" progId="Equation.DSMT4">
+                <p:oleObj spid="_x0000_s4125" name="Equation" r:id="rId3" imgW="3682800" imgH="914400" progId="Equation.DSMT4">
                   <p:embed/>
                 </p:oleObj>
               </mc:Choice>
@@ -4459,7 +5349,7 @@
           <a:p>
             <a:r>
               <a:rPr lang="en-SG" dirty="0" smtClean="0"/>
-              <a:t>Screen coordinate system (SCS)</a:t>
+              <a:t>Some useful HT matrices</a:t>
             </a:r>
             <a:endParaRPr lang="en-SG" dirty="0"/>
           </a:p>
@@ -4475,274 +5365,80 @@
             <p:ph idx="1"/>
           </p:nvPr>
         </p:nvSpPr>
-        <p:spPr>
-          <a:xfrm>
-            <a:off x="838200" y="1825625"/>
-            <a:ext cx="6775958" cy="4351338"/>
-          </a:xfrm>
-        </p:spPr>
-        <p:txBody>
-          <a:bodyPr>
-            <a:normAutofit lnSpcReduction="10000"/>
-          </a:bodyPr>
+        <p:spPr/>
+        <p:txBody>
+          <a:bodyPr/>
           <a:lstStyle/>
           <a:p>
             <a:r>
               <a:rPr lang="en-SG" dirty="0" smtClean="0"/>
-              <a:t>The coordinate system of screen is a 2D Cartesian coordinate system, which origin (0,0) locates at left-upper corner of the screen. The scale of SCS usually depends on the resolution of screen. For example if the revolution of a screen is 1096x1024, which means the X axis extend to right of screen until scale of 1096, and the Y axis extend to bottom of screen until scale of 1024.</a:t>
-            </a:r>
-          </a:p>
-          <a:p>
-            <a:r>
-              <a:rPr lang="en-SG" dirty="0" smtClean="0"/>
-              <a:t>The SCS is mainly used to display correct images on screen device. So it is pixel related. </a:t>
+              <a:t>Matrix without perspective involved</a:t>
             </a:r>
             <a:endParaRPr lang="en-SG" dirty="0"/>
           </a:p>
         </p:txBody>
       </p:sp>
-      <p:sp>
-        <p:nvSpPr>
-          <p:cNvPr id="4" name="矩形 3"/>
-          <p:cNvSpPr/>
-          <p:nvPr/>
-        </p:nvSpPr>
-        <p:spPr>
-          <a:xfrm>
-            <a:off x="7919049" y="2449902"/>
-            <a:ext cx="3881887" cy="2544792"/>
-          </a:xfrm>
-          <a:prstGeom prst="rect">
-            <a:avLst/>
-          </a:prstGeom>
-          <a:noFill/>
-        </p:spPr>
-        <p:style>
-          <a:lnRef idx="2">
-            <a:schemeClr val="accent1">
-              <a:shade val="50000"/>
-            </a:schemeClr>
-          </a:lnRef>
-          <a:fillRef idx="1">
-            <a:schemeClr val="accent1"/>
-          </a:fillRef>
-          <a:effectRef idx="0">
-            <a:schemeClr val="accent1"/>
-          </a:effectRef>
-          <a:fontRef idx="minor">
-            <a:schemeClr val="lt1"/>
-          </a:fontRef>
-        </p:style>
-        <p:txBody>
-          <a:bodyPr rtlCol="0" anchor="ctr"/>
-          <a:lstStyle/>
-          <a:p>
-            <a:pPr algn="ctr"/>
-            <a:endParaRPr lang="en-SG"/>
-          </a:p>
-        </p:txBody>
-      </p:sp>
-      <p:sp>
-        <p:nvSpPr>
-          <p:cNvPr id="7" name="矩形 6"/>
-          <p:cNvSpPr/>
-          <p:nvPr/>
-        </p:nvSpPr>
-        <p:spPr>
-          <a:xfrm>
-            <a:off x="7782560" y="2357120"/>
-            <a:ext cx="4145280" cy="2773680"/>
-          </a:xfrm>
-          <a:prstGeom prst="rect">
-            <a:avLst/>
-          </a:prstGeom>
-          <a:noFill/>
-        </p:spPr>
-        <p:style>
-          <a:lnRef idx="2">
-            <a:schemeClr val="accent1">
-              <a:shade val="50000"/>
-            </a:schemeClr>
-          </a:lnRef>
-          <a:fillRef idx="1">
-            <a:schemeClr val="accent1"/>
-          </a:fillRef>
-          <a:effectRef idx="0">
-            <a:schemeClr val="accent1"/>
-          </a:effectRef>
-          <a:fontRef idx="minor">
-            <a:schemeClr val="lt1"/>
-          </a:fontRef>
-        </p:style>
-        <p:txBody>
-          <a:bodyPr rtlCol="0" anchor="ctr"/>
-          <a:lstStyle/>
-          <a:p>
-            <a:pPr algn="ctr"/>
-            <a:endParaRPr lang="en-SG"/>
-          </a:p>
-        </p:txBody>
-      </p:sp>
-      <p:cxnSp>
-        <p:nvCxnSpPr>
-          <p:cNvPr id="9" name="直接箭头连接符 8"/>
-          <p:cNvCxnSpPr/>
-          <p:nvPr/>
-        </p:nvCxnSpPr>
-        <p:spPr>
-          <a:xfrm flipV="1">
-            <a:off x="8087360" y="2631440"/>
-            <a:ext cx="2214880" cy="10160"/>
-          </a:xfrm>
-          <a:prstGeom prst="straightConnector1">
-            <a:avLst/>
-          </a:prstGeom>
-          <a:ln>
-            <a:tailEnd type="triangle"/>
-          </a:ln>
-        </p:spPr>
-        <p:style>
-          <a:lnRef idx="1">
-            <a:schemeClr val="dk1"/>
-          </a:lnRef>
-          <a:fillRef idx="0">
-            <a:schemeClr val="dk1"/>
-          </a:fillRef>
-          <a:effectRef idx="0">
-            <a:schemeClr val="dk1"/>
-          </a:effectRef>
-          <a:fontRef idx="minor">
-            <a:schemeClr val="tx1"/>
-          </a:fontRef>
-        </p:style>
-      </p:cxnSp>
-      <p:cxnSp>
-        <p:nvCxnSpPr>
-          <p:cNvPr id="11" name="直接箭头连接符 10"/>
-          <p:cNvCxnSpPr/>
-          <p:nvPr/>
-        </p:nvCxnSpPr>
-        <p:spPr>
-          <a:xfrm>
-            <a:off x="8087360" y="2651760"/>
-            <a:ext cx="0" cy="1645920"/>
-          </a:xfrm>
-          <a:prstGeom prst="straightConnector1">
-            <a:avLst/>
-          </a:prstGeom>
-          <a:ln>
-            <a:tailEnd type="triangle"/>
-          </a:ln>
-        </p:spPr>
-        <p:style>
-          <a:lnRef idx="1">
-            <a:schemeClr val="dk1"/>
-          </a:lnRef>
-          <a:fillRef idx="0">
-            <a:schemeClr val="dk1"/>
-          </a:fillRef>
-          <a:effectRef idx="0">
-            <a:schemeClr val="dk1"/>
-          </a:effectRef>
-          <a:fontRef idx="minor">
-            <a:schemeClr val="tx1"/>
-          </a:fontRef>
-        </p:style>
-      </p:cxnSp>
-      <p:sp>
-        <p:nvSpPr>
-          <p:cNvPr id="12" name="文本框 11"/>
-          <p:cNvSpPr txBox="1"/>
-          <p:nvPr/>
-        </p:nvSpPr>
-        <p:spPr>
-          <a:xfrm>
-            <a:off x="10322606" y="2631440"/>
-            <a:ext cx="304892" cy="369332"/>
-          </a:xfrm>
-          <a:prstGeom prst="rect">
-            <a:avLst/>
-          </a:prstGeom>
-          <a:noFill/>
-        </p:spPr>
-        <p:txBody>
-          <a:bodyPr wrap="none" rtlCol="0">
-            <a:spAutoFit/>
-          </a:bodyPr>
-          <a:lstStyle/>
-          <a:p>
-            <a:r>
-              <a:rPr lang="en-SG" dirty="0" smtClean="0"/>
-              <a:t>X</a:t>
-            </a:r>
-            <a:endParaRPr lang="en-SG" dirty="0"/>
-          </a:p>
-        </p:txBody>
-      </p:sp>
-      <p:sp>
-        <p:nvSpPr>
-          <p:cNvPr id="13" name="文本框 12"/>
-          <p:cNvSpPr txBox="1"/>
-          <p:nvPr/>
-        </p:nvSpPr>
-        <p:spPr>
-          <a:xfrm>
-            <a:off x="8087360" y="4205796"/>
-            <a:ext cx="304892" cy="369332"/>
-          </a:xfrm>
-          <a:prstGeom prst="rect">
-            <a:avLst/>
-          </a:prstGeom>
-          <a:noFill/>
-        </p:spPr>
-        <p:txBody>
-          <a:bodyPr wrap="none" rtlCol="0">
-            <a:spAutoFit/>
-          </a:bodyPr>
-          <a:lstStyle/>
-          <a:p>
-            <a:r>
-              <a:rPr lang="en-SG" dirty="0" smtClean="0"/>
-              <a:t>Y</a:t>
-            </a:r>
-            <a:endParaRPr lang="en-SG" dirty="0"/>
-          </a:p>
-        </p:txBody>
-      </p:sp>
-      <p:sp>
-        <p:nvSpPr>
-          <p:cNvPr id="14" name="文本框 13"/>
-          <p:cNvSpPr txBox="1"/>
-          <p:nvPr/>
-        </p:nvSpPr>
-        <p:spPr>
-          <a:xfrm>
-            <a:off x="8133839" y="2725564"/>
-            <a:ext cx="617477" cy="369332"/>
-          </a:xfrm>
-          <a:prstGeom prst="rect">
-            <a:avLst/>
-          </a:prstGeom>
-          <a:noFill/>
-        </p:spPr>
-        <p:txBody>
-          <a:bodyPr wrap="none" rtlCol="0">
-            <a:spAutoFit/>
-          </a:bodyPr>
-          <a:lstStyle/>
-          <a:p>
-            <a:r>
-              <a:rPr lang="en-SG" dirty="0" smtClean="0"/>
-              <a:t>(0,0)</a:t>
-            </a:r>
-            <a:endParaRPr lang="en-SG" dirty="0"/>
-          </a:p>
-        </p:txBody>
-      </p:sp>
+      <p:graphicFrame>
+        <p:nvGraphicFramePr>
+          <p:cNvPr id="5" name="对象 4"/>
+          <p:cNvGraphicFramePr>
+            <a:graphicFrameLocks noChangeAspect="1"/>
+          </p:cNvGraphicFramePr>
+          <p:nvPr>
+            <p:extLst>
+              <p:ext uri="{D42A27DB-BD31-4B8C-83A1-F6EECF244321}">
+                <p14:modId xmlns:p14="http://schemas.microsoft.com/office/powerpoint/2010/main" val="2993923950"/>
+              </p:ext>
+            </p:extLst>
+          </p:nvPr>
+        </p:nvGraphicFramePr>
+        <p:xfrm>
+          <a:off x="4632385" y="2910587"/>
+          <a:ext cx="2493034" cy="1972510"/>
+        </p:xfrm>
+        <a:graphic>
+          <a:graphicData uri="http://schemas.openxmlformats.org/presentationml/2006/ole">
+            <mc:AlternateContent xmlns:mc="http://schemas.openxmlformats.org/markup-compatibility/2006">
+              <mc:Choice xmlns:v="urn:schemas-microsoft-com:vml" Requires="v">
+                <p:oleObj spid="_x0000_s5132" name="Equation" r:id="rId3" imgW="1155600" imgH="914400" progId="Equation.DSMT4">
+                  <p:embed/>
+                </p:oleObj>
+              </mc:Choice>
+              <mc:Fallback>
+                <p:oleObj name="Equation" r:id="rId3" imgW="1155600" imgH="914400" progId="Equation.DSMT4">
+                  <p:embed/>
+                  <p:pic>
+                    <p:nvPicPr>
+                      <p:cNvPr id="0" name=""/>
+                      <p:cNvPicPr/>
+                      <p:nvPr/>
+                    </p:nvPicPr>
+                    <p:blipFill>
+                      <a:blip r:embed="rId4"/>
+                      <a:stretch>
+                        <a:fillRect/>
+                      </a:stretch>
+                    </p:blipFill>
+                    <p:spPr>
+                      <a:xfrm>
+                        <a:off x="4632385" y="2910587"/>
+                        <a:ext cx="2493034" cy="1972510"/>
+                      </a:xfrm>
+                      <a:prstGeom prst="rect">
+                        <a:avLst/>
+                      </a:prstGeom>
+                    </p:spPr>
+                  </p:pic>
+                </p:oleObj>
+              </mc:Fallback>
+            </mc:AlternateContent>
+          </a:graphicData>
+        </a:graphic>
+      </p:graphicFrame>
     </p:spTree>
     <p:extLst>
       <p:ext uri="{BB962C8B-B14F-4D97-AF65-F5344CB8AC3E}">
-        <p14:creationId xmlns:p14="http://schemas.microsoft.com/office/powerpoint/2010/main" val="4149977321"/>
+        <p14:creationId xmlns:p14="http://schemas.microsoft.com/office/powerpoint/2010/main" val="398473617"/>
       </p:ext>
     </p:extLst>
   </p:cSld>

</xml_diff>